<commit_message>
SCR 14 neue Lizenzen eingepflegt
</commit_message>
<xml_diff>
--- a/training-cards/music moves/Scrum (SCR)/ger/apprentice/ger_SCR_14_Was_passt_in_eine_Woche_MM_A.pptx
+++ b/training-cards/music moves/Scrum (SCR)/ger/apprentice/ger_SCR_14_Was_passt_in_eine_Woche_MM_A.pptx
@@ -169,10 +169,9 @@
           </a:lstStyle>
           <a:p>
             <a:r>
-              <a:rPr lang="de-DE" dirty="0" smtClean="0"/>
+              <a:rPr lang="de-DE" dirty="0"/>
               <a:t>TITEL HINZUFÜGEN</a:t>
             </a:r>
-            <a:endParaRPr lang="de-DE" dirty="0"/>
           </a:p>
         </p:txBody>
       </p:sp>
@@ -203,35 +202,35 @@
           <a:p>
             <a:pPr lvl="0"/>
             <a:r>
-              <a:rPr lang="de-DE" smtClean="0"/>
+              <a:rPr lang="de-DE"/>
               <a:t>Mastertextformat bearbeiten</a:t>
             </a:r>
           </a:p>
           <a:p>
             <a:pPr lvl="1"/>
             <a:r>
-              <a:rPr lang="de-DE" smtClean="0"/>
+              <a:rPr lang="de-DE"/>
               <a:t>Zweite Ebene</a:t>
             </a:r>
           </a:p>
           <a:p>
             <a:pPr lvl="2"/>
             <a:r>
-              <a:rPr lang="de-DE" smtClean="0"/>
+              <a:rPr lang="de-DE"/>
               <a:t>Dritte Ebene</a:t>
             </a:r>
           </a:p>
           <a:p>
             <a:pPr lvl="3"/>
             <a:r>
-              <a:rPr lang="de-DE" smtClean="0"/>
+              <a:rPr lang="de-DE"/>
               <a:t>Vierte Ebene</a:t>
             </a:r>
           </a:p>
           <a:p>
             <a:pPr lvl="4"/>
             <a:r>
-              <a:rPr lang="de-DE" smtClean="0"/>
+              <a:rPr lang="de-DE"/>
               <a:t>Fünfte Ebene</a:t>
             </a:r>
             <a:endParaRPr lang="de-DE" dirty="0"/>
@@ -278,7 +277,7 @@
               <a:buNone/>
             </a:pPr>
             <a:r>
-              <a:rPr lang="de-DE" smtClean="0"/>
+              <a:rPr lang="de-DE"/>
               <a:t>Master-Untertitelformat bearbeiten</a:t>
             </a:r>
             <a:endParaRPr lang="de-DE" dirty="0"/>
@@ -394,35 +393,35 @@
           <a:p>
             <a:pPr lvl="0"/>
             <a:r>
-              <a:rPr lang="de-DE" smtClean="0"/>
+              <a:rPr lang="de-DE"/>
               <a:t>Mastertextformat bearbeiten</a:t>
             </a:r>
           </a:p>
           <a:p>
             <a:pPr lvl="1"/>
             <a:r>
-              <a:rPr lang="de-DE" smtClean="0"/>
+              <a:rPr lang="de-DE"/>
               <a:t>Zweite Ebene</a:t>
             </a:r>
           </a:p>
           <a:p>
             <a:pPr lvl="2"/>
             <a:r>
-              <a:rPr lang="de-DE" smtClean="0"/>
+              <a:rPr lang="de-DE"/>
               <a:t>Dritte Ebene</a:t>
             </a:r>
           </a:p>
           <a:p>
             <a:pPr lvl="3"/>
             <a:r>
-              <a:rPr lang="de-DE" smtClean="0"/>
+              <a:rPr lang="de-DE"/>
               <a:t>Vierte Ebene</a:t>
             </a:r>
           </a:p>
           <a:p>
             <a:pPr lvl="4"/>
             <a:r>
-              <a:rPr lang="de-DE" smtClean="0"/>
+              <a:rPr lang="de-DE"/>
               <a:t>Fünfte Ebene</a:t>
             </a:r>
             <a:endParaRPr lang="de-DE" dirty="0"/>
@@ -452,7 +451,7 @@
           <a:lstStyle/>
           <a:p>
             <a:r>
-              <a:rPr lang="de-DE" sz="2400" dirty="0" smtClean="0">
+              <a:rPr lang="de-DE" sz="2400" dirty="0">
                 <a:solidFill>
                   <a:srgbClr val="7E006B"/>
                 </a:solidFill>
@@ -462,7 +461,7 @@
               <a:t>TRAININGS</a:t>
             </a:r>
             <a:r>
-              <a:rPr lang="de-DE" sz="2400" dirty="0" smtClean="0">
+              <a:rPr lang="de-DE" sz="2400" dirty="0">
                 <a:solidFill>
                   <a:srgbClr val="7E006B"/>
                 </a:solidFill>
@@ -511,143 +510,6 @@
           </a:prstGeom>
         </p:spPr>
       </p:pic>
-      <p:sp>
-        <p:nvSpPr>
-          <p:cNvPr id="5" name="Shape 7"/>
-          <p:cNvSpPr/>
-          <p:nvPr userDrawn="1"/>
-        </p:nvSpPr>
-        <p:spPr>
-          <a:xfrm>
-            <a:off x="1683417" y="4952581"/>
-            <a:ext cx="4196016" cy="276995"/>
-          </a:xfrm>
-          <a:prstGeom prst="rect">
-            <a:avLst/>
-          </a:prstGeom>
-          <a:ln w="12700">
-            <a:miter lim="400000"/>
-          </a:ln>
-          <a:extLst>
-            <a:ext uri="{C572A759-6A51-4108-AA02-DFA0A04FC94B}">
-              <ma14:wrappingTextBoxFlag xmlns:ma14="http://schemas.microsoft.com/office/mac/drawingml/2011/main" val="1"/>
-            </a:ext>
-          </a:extLst>
-        </p:spPr>
-        <p:txBody>
-          <a:bodyPr wrap="none" lIns="45718" tIns="45718" rIns="45718" bIns="45718">
-            <a:spAutoFit/>
-          </a:bodyPr>
-          <a:lstStyle/>
-          <a:p>
-            <a:pPr lvl="0" algn="ctr">
-              <a:defRPr sz="1800"/>
-            </a:pPr>
-            <a:r>
-              <a:rPr sz="600" dirty="0">
-                <a:latin typeface="Avenir Light"/>
-                <a:ea typeface="Calibri"/>
-                <a:cs typeface="Avenir Light"/>
-                <a:sym typeface="Calibri"/>
-              </a:rPr>
-              <a:t>This work is licensed under the Creative Commons Attribution-NonCommercial-NoDerivatives 4.0 International License. </a:t>
-            </a:r>
-          </a:p>
-          <a:p>
-            <a:pPr lvl="0" algn="ctr">
-              <a:defRPr sz="1800"/>
-            </a:pPr>
-            <a:r>
-              <a:rPr sz="600" dirty="0">
-                <a:latin typeface="Avenir Light"/>
-                <a:ea typeface="Calibri"/>
-                <a:cs typeface="Avenir Light"/>
-                <a:sym typeface="Calibri"/>
-              </a:rPr>
-              <a:t>To view a copy of this license, visit http://creativecommons.org/licenses/by-nc-nd/4.0/.</a:t>
-            </a:r>
-          </a:p>
-        </p:txBody>
-      </p:sp>
-      <p:pic>
-        <p:nvPicPr>
-          <p:cNvPr id="6" name="pasted-image.tif"/>
-          <p:cNvPicPr/>
-          <p:nvPr userDrawn="1"/>
-        </p:nvPicPr>
-        <p:blipFill>
-          <a:blip r:embed="rId4">
-            <a:extLst/>
-          </a:blip>
-          <a:stretch>
-            <a:fillRect/>
-          </a:stretch>
-        </p:blipFill>
-        <p:spPr>
-          <a:xfrm>
-            <a:off x="6174185" y="4992838"/>
-            <a:ext cx="886619" cy="214128"/>
-          </a:xfrm>
-          <a:prstGeom prst="rect">
-            <a:avLst/>
-          </a:prstGeom>
-          <a:ln w="12700">
-            <a:miter lim="400000"/>
-          </a:ln>
-        </p:spPr>
-      </p:pic>
-      <p:sp>
-        <p:nvSpPr>
-          <p:cNvPr id="7" name="Textfeld 6"/>
-          <p:cNvSpPr txBox="1"/>
-          <p:nvPr userDrawn="1"/>
-        </p:nvSpPr>
-        <p:spPr>
-          <a:xfrm>
-            <a:off x="239285" y="4936890"/>
-            <a:ext cx="1044856" cy="276999"/>
-          </a:xfrm>
-          <a:prstGeom prst="rect">
-            <a:avLst/>
-          </a:prstGeom>
-          <a:noFill/>
-        </p:spPr>
-        <p:txBody>
-          <a:bodyPr wrap="square" rtlCol="0">
-            <a:spAutoFit/>
-          </a:bodyPr>
-          <a:lstStyle/>
-          <a:p>
-            <a:r>
-              <a:rPr lang="de-DE" sz="600" dirty="0">
-                <a:solidFill>
-                  <a:srgbClr val="5D5E5F"/>
-                </a:solidFill>
-                <a:latin typeface="Avenir Light"/>
-                <a:cs typeface="Avenir Light"/>
-              </a:rPr>
-              <a:t>Letzte Änderung: </a:t>
-            </a:r>
-            <a:fld id="{7A8C7DAC-E536-564C-B5B3-90E8FAB50562}" type="datetime1">
-              <a:rPr lang="de-DE" sz="600" smtClean="0">
-                <a:solidFill>
-                  <a:srgbClr val="5D5E5F"/>
-                </a:solidFill>
-                <a:latin typeface="Avenir Light"/>
-                <a:cs typeface="Avenir Light"/>
-              </a:rPr>
-              <a:t>22.02.16</a:t>
-            </a:fld>
-            <a:endParaRPr lang="de-DE" sz="600" dirty="0">
-              <a:solidFill>
-                <a:srgbClr val="5D5E5F"/>
-              </a:solidFill>
-              <a:latin typeface="Avenir Light"/>
-              <a:cs typeface="Avenir Light"/>
-            </a:endParaRPr>
-          </a:p>
-        </p:txBody>
-      </p:sp>
     </p:spTree>
     <p:extLst>
       <p:ext uri="{BB962C8B-B14F-4D97-AF65-F5344CB8AC3E}">
@@ -694,10 +556,9 @@
           <a:lstStyle/>
           <a:p>
             <a:r>
-              <a:rPr lang="de-DE" smtClean="0"/>
+              <a:rPr lang="de-DE"/>
               <a:t>Mastertitelformat bearbeiten</a:t>
             </a:r>
-            <a:endParaRPr lang="de-DE"/>
           </a:p>
         </p:txBody>
       </p:sp>
@@ -718,7 +579,7 @@
           <a:p>
             <a:fld id="{FF5B2BAF-DF38-0A48-A798-0C06E514FD52}" type="datetimeFigureOut">
               <a:rPr lang="de-DE" smtClean="0"/>
-              <a:t>22.02.16</a:t>
+              <a:t>23.07.23</a:t>
             </a:fld>
             <a:endParaRPr lang="de-DE" dirty="0"/>
           </a:p>
@@ -829,17 +690,16 @@
           <a:p>
             <a:pPr marL="0" lvl="0" algn="l"/>
             <a:r>
-              <a:rPr lang="de-DE" dirty="0" smtClean="0"/>
+              <a:rPr lang="de-DE" dirty="0"/>
               <a:t>Überschrift </a:t>
             </a:r>
             <a:br>
-              <a:rPr lang="de-DE" dirty="0" smtClean="0"/>
+              <a:rPr lang="de-DE" dirty="0"/>
             </a:br>
             <a:r>
-              <a:rPr lang="de-DE" dirty="0" smtClean="0"/>
+              <a:rPr lang="de-DE" dirty="0"/>
               <a:t>bearbeiten </a:t>
             </a:r>
-            <a:endParaRPr lang="de-DE" dirty="0"/>
           </a:p>
         </p:txBody>
       </p:sp>
@@ -870,38 +730,37 @@
           <a:p>
             <a:pPr lvl="0"/>
             <a:r>
-              <a:rPr lang="de-DE" dirty="0" smtClean="0"/>
+              <a:rPr lang="de-DE" dirty="0"/>
               <a:t>Mastertextformat bearbeiten</a:t>
             </a:r>
           </a:p>
           <a:p>
             <a:pPr lvl="1"/>
             <a:r>
-              <a:rPr lang="de-DE" dirty="0" smtClean="0"/>
+              <a:rPr lang="de-DE" dirty="0"/>
               <a:t>Zweite Ebene</a:t>
             </a:r>
           </a:p>
           <a:p>
             <a:pPr lvl="2"/>
             <a:r>
-              <a:rPr lang="de-DE" dirty="0" smtClean="0"/>
+              <a:rPr lang="de-DE" dirty="0"/>
               <a:t>Dritte Ebene</a:t>
             </a:r>
           </a:p>
           <a:p>
             <a:pPr lvl="3"/>
             <a:r>
-              <a:rPr lang="de-DE" dirty="0" smtClean="0"/>
+              <a:rPr lang="de-DE" dirty="0"/>
               <a:t>Vierte Ebene</a:t>
             </a:r>
           </a:p>
           <a:p>
             <a:pPr lvl="4"/>
             <a:r>
-              <a:rPr lang="de-DE" dirty="0" smtClean="0"/>
+              <a:rPr lang="de-DE" dirty="0"/>
               <a:t>Fünfte Ebene</a:t>
             </a:r>
-            <a:endParaRPr lang="de-DE" dirty="0"/>
           </a:p>
         </p:txBody>
       </p:sp>
@@ -940,7 +799,7 @@
           <a:p>
             <a:fld id="{FF5B2BAF-DF38-0A48-A798-0C06E514FD52}" type="datetimeFigureOut">
               <a:rPr lang="de-DE" smtClean="0"/>
-              <a:t>22.02.16</a:t>
+              <a:t>23.07.23</a:t>
             </a:fld>
             <a:endParaRPr lang="de-DE" dirty="0"/>
           </a:p>
@@ -1174,7 +1033,7 @@
           <a:lstStyle/>
           <a:p>
             <a:r>
-              <a:rPr lang="de-DE" sz="1050" b="1" dirty="0" smtClean="0">
+              <a:rPr lang="de-DE" sz="1050" b="1" dirty="0">
                 <a:solidFill>
                   <a:schemeClr val="bg1"/>
                 </a:solidFill>
@@ -1184,7 +1043,7 @@
               <a:t>TRAININGSKARTE</a:t>
             </a:r>
             <a:r>
-              <a:rPr lang="de-DE" sz="1050" dirty="0" smtClean="0">
+              <a:rPr lang="de-DE" sz="1050" dirty="0">
                 <a:solidFill>
                   <a:schemeClr val="bg1"/>
                 </a:solidFill>
@@ -1194,7 +1053,7 @@
               <a:t> </a:t>
             </a:r>
             <a:r>
-              <a:rPr lang="de-DE" sz="1050" b="1" dirty="0" smtClean="0">
+              <a:rPr lang="de-DE" sz="1050" b="1" dirty="0">
                 <a:solidFill>
                   <a:schemeClr val="bg1"/>
                 </a:solidFill>
@@ -1203,13 +1062,6 @@
               </a:rPr>
               <a:t>SCR 14</a:t>
             </a:r>
-            <a:endParaRPr lang="de-DE" sz="1050" b="1" dirty="0">
-              <a:solidFill>
-                <a:schemeClr val="bg1"/>
-              </a:solidFill>
-              <a:latin typeface="Avenir Heavy"/>
-              <a:cs typeface="Avenir Heavy"/>
-            </a:endParaRPr>
           </a:p>
         </p:txBody>
       </p:sp>
@@ -1592,38 +1444,16 @@
           <a:lstStyle/>
           <a:p>
             <a:r>
-              <a:rPr lang="de-DE" dirty="0" smtClean="0">
+              <a:rPr lang="de-DE" dirty="0">
                 <a:latin typeface="Avenir Heavy"/>
                 <a:cs typeface="Avenir Heavy"/>
               </a:rPr>
-              <a:t>WAS</a:t>
-            </a:r>
-            <a:r>
-              <a:rPr lang="de-DE" dirty="0" smtClean="0">
-                <a:latin typeface="Avenir Heavy"/>
-                <a:cs typeface="Avenir Heavy"/>
-              </a:rPr>
-              <a:t> </a:t>
-            </a:r>
-            <a:r>
-              <a:rPr lang="de-DE" dirty="0" smtClean="0">
-                <a:latin typeface="Avenir Heavy"/>
-                <a:cs typeface="Avenir Heavy"/>
-              </a:rPr>
-              <a:t>PASST</a:t>
-            </a:r>
-            <a:r>
-              <a:rPr lang="de-DE" dirty="0" smtClean="0">
-                <a:latin typeface="Avenir Heavy"/>
-                <a:cs typeface="Avenir Heavy"/>
-              </a:rPr>
-              <a:t> </a:t>
-            </a:r>
-            <a:r>
-              <a:rPr lang="de-DE" dirty="0" smtClean="0"/>
+              <a:t>WAS PASST </a:t>
+            </a:r>
+            <a:r>
+              <a:rPr lang="de-DE" dirty="0"/>
               <a:t>IN EINE WOCHE?</a:t>
             </a:r>
-            <a:endParaRPr lang="de-DE" dirty="0"/>
           </a:p>
         </p:txBody>
       </p:sp>
@@ -1646,7 +1476,7 @@
           <a:p>
             <a:r>
               <a:rPr lang="de-DE" sz="1200" dirty="0"/>
-              <a:t>Parallel zu den ersten beiden TOM-Phasen, in denen die Tomatentechnik und der Tagesplan trainiert wird, ist auch das Training für die Wochenplanung aufgebaut. </a:t>
+              <a:t>Parallel zu den ersten beiden TOM-Pläne, in denen die Tomatentechnik und der Tagesplan trainiert wird, ist auch das Training für die Wochenplanung aufgebaut. </a:t>
             </a:r>
           </a:p>
           <a:p>
@@ -1666,7 +1496,6 @@
               <a:rPr lang="de-DE" sz="1200" dirty="0"/>
               <a:t>Wenn Du diesen Move machst, versuche davon auszugehen, ein Pensum zu planen, das Du über längere Zeit halten kannst. Wenn Du zu viel in diesen Move packst, hast Du später, wenn Du die gemessene Wochenkapazität als Vorlage für eine Wochenplanung nimmst, nicht mehr die Ausdauer es auch über mehrere Wochen durchzuhalten.</a:t>
             </a:r>
-            <a:endParaRPr lang="de-DE" sz="1200" dirty="0"/>
           </a:p>
         </p:txBody>
       </p:sp>
@@ -1689,10 +1518,9 @@
               <a:buNone/>
             </a:pPr>
             <a:r>
-              <a:rPr lang="de-DE" dirty="0" smtClean="0"/>
+              <a:rPr lang="de-DE" dirty="0"/>
               <a:t>Regina Brandhuber</a:t>
             </a:r>
-            <a:endParaRPr lang="de-DE" dirty="0"/>
           </a:p>
         </p:txBody>
       </p:sp>
@@ -1769,15 +1597,11 @@
               <a:rPr lang="de-DE" sz="1200"/>
               <a:t>in </a:t>
             </a:r>
-            <a:r>
-              <a:rPr lang="de-DE" sz="1200" smtClean="0"/>
-              <a:t/>
-            </a:r>
             <a:br>
-              <a:rPr lang="de-DE" sz="1200" smtClean="0"/>
+              <a:rPr lang="de-DE" sz="1200"/>
             </a:br>
             <a:r>
-              <a:rPr lang="de-DE" sz="1200" smtClean="0"/>
+              <a:rPr lang="de-DE" sz="1200"/>
               <a:t>Tomateneinheiten</a:t>
             </a:r>
             <a:r>
@@ -1790,25 +1614,324 @@
               <a:rPr lang="de-DE" sz="1200" dirty="0"/>
               <a:t>Zeige Deine Dokumentation Deinem Team und lass Dich </a:t>
             </a:r>
-            <a:r>
-              <a:rPr lang="de-DE" sz="1200" dirty="0" smtClean="0"/>
-              <a:t/>
-            </a:r>
             <a:br>
-              <a:rPr lang="de-DE" sz="1200" dirty="0" smtClean="0"/>
+              <a:rPr lang="de-DE" sz="1200" dirty="0"/>
             </a:br>
             <a:r>
-              <a:rPr lang="de-DE" sz="1200" dirty="0" smtClean="0"/>
-              <a:t>zertifizieren</a:t>
-            </a:r>
-            <a:r>
               <a:rPr lang="de-DE" sz="1200" dirty="0"/>
-              <a:t>.</a:t>
-            </a:r>
-            <a:endParaRPr lang="de-DE" sz="1200" dirty="0"/>
+              <a:t>zertifizieren.</a:t>
+            </a:r>
           </a:p>
         </p:txBody>
       </p:sp>
+      <p:sp>
+        <p:nvSpPr>
+          <p:cNvPr id="3" name="Shape 7">
+            <a:extLst>
+              <a:ext uri="{FF2B5EF4-FFF2-40B4-BE49-F238E27FC236}">
+                <a16:creationId xmlns:a16="http://schemas.microsoft.com/office/drawing/2014/main" id="{C6BCDA34-DD61-02E7-CEE9-F1A1388F6C73}"/>
+              </a:ext>
+            </a:extLst>
+          </p:cNvPr>
+          <p:cNvSpPr/>
+          <p:nvPr/>
+        </p:nvSpPr>
+        <p:spPr>
+          <a:xfrm>
+            <a:off x="971550" y="4689585"/>
+            <a:ext cx="4691860" cy="461661"/>
+          </a:xfrm>
+          <a:prstGeom prst="rect">
+            <a:avLst/>
+          </a:prstGeom>
+          <a:ln w="12700">
+            <a:miter lim="400000"/>
+          </a:ln>
+          <a:extLst>
+            <a:ext uri="{C572A759-6A51-4108-AA02-DFA0A04FC94B}">
+              <ma14:wrappingTextBoxFlag xmlns="" xmlns:ma14="http://schemas.microsoft.com/office/mac/drawingml/2011/main" val="1"/>
+            </a:ext>
+          </a:extLst>
+        </p:spPr>
+        <p:txBody>
+          <a:bodyPr wrap="square" lIns="45718" tIns="45718" rIns="45718" bIns="45718">
+            <a:spAutoFit/>
+          </a:bodyPr>
+          <a:lstStyle/>
+          <a:p>
+            <a:pPr lvl="0" algn="ctr">
+              <a:defRPr sz="1800"/>
+            </a:pPr>
+            <a:r>
+              <a:rPr lang="de-DE" sz="800" b="0" i="0" u="none" strike="noStrike" dirty="0" err="1">
+                <a:solidFill>
+                  <a:schemeClr val="tx1">
+                    <a:lumMod val="65000"/>
+                    <a:lumOff val="35000"/>
+                  </a:schemeClr>
+                </a:solidFill>
+                <a:effectLst/>
+                <a:latin typeface="Avenir Book" panose="02000503020000020003" pitchFamily="2" charset="0"/>
+              </a:rPr>
+              <a:t>music</a:t>
+            </a:r>
+            <a:r>
+              <a:rPr lang="de-DE" sz="800" b="0" i="0" u="none" strike="noStrike" dirty="0">
+                <a:solidFill>
+                  <a:schemeClr val="tx1">
+                    <a:lumMod val="65000"/>
+                    <a:lumOff val="35000"/>
+                  </a:schemeClr>
+                </a:solidFill>
+                <a:effectLst/>
+                <a:latin typeface="Avenir Book" panose="02000503020000020003" pitchFamily="2" charset="0"/>
+              </a:rPr>
+              <a:t> </a:t>
+            </a:r>
+            <a:r>
+              <a:rPr lang="de-DE" sz="800" b="0" i="0" u="none" strike="noStrike" dirty="0" err="1">
+                <a:solidFill>
+                  <a:schemeClr val="tx1">
+                    <a:lumMod val="65000"/>
+                    <a:lumOff val="35000"/>
+                  </a:schemeClr>
+                </a:solidFill>
+                <a:effectLst/>
+                <a:latin typeface="Avenir Book" panose="02000503020000020003" pitchFamily="2" charset="0"/>
+              </a:rPr>
+              <a:t>moves</a:t>
+            </a:r>
+            <a:r>
+              <a:rPr lang="de-DE" sz="800" b="0" i="0" u="none" strike="noStrike" dirty="0">
+                <a:solidFill>
+                  <a:schemeClr val="tx1">
+                    <a:lumMod val="65000"/>
+                    <a:lumOff val="35000"/>
+                  </a:schemeClr>
+                </a:solidFill>
+                <a:effectLst/>
+                <a:latin typeface="Avenir Book" panose="02000503020000020003" pitchFamily="2" charset="0"/>
+              </a:rPr>
+              <a:t>-Trainingskarten von Regina Brandhuber sind lizenziert unter einer Creative Commons </a:t>
+            </a:r>
+          </a:p>
+          <a:p>
+            <a:pPr lvl="0" algn="ctr">
+              <a:defRPr sz="1800"/>
+            </a:pPr>
+            <a:r>
+              <a:rPr lang="de-DE" sz="800" b="0" i="0" u="none" strike="noStrike" dirty="0">
+                <a:solidFill>
+                  <a:schemeClr val="tx1">
+                    <a:lumMod val="65000"/>
+                    <a:lumOff val="35000"/>
+                  </a:schemeClr>
+                </a:solidFill>
+                <a:effectLst/>
+                <a:latin typeface="Avenir Book" panose="02000503020000020003" pitchFamily="2" charset="0"/>
+              </a:rPr>
+              <a:t>Namensnennung-Nicht kommerziell 4.0 International Lizenz.</a:t>
+            </a:r>
+          </a:p>
+          <a:p>
+            <a:pPr lvl="0" algn="ctr">
+              <a:defRPr sz="1800"/>
+            </a:pPr>
+            <a:r>
+              <a:rPr lang="de-DE" sz="800" dirty="0">
+                <a:solidFill>
+                  <a:schemeClr val="tx1">
+                    <a:lumMod val="65000"/>
+                    <a:lumOff val="35000"/>
+                  </a:schemeClr>
+                </a:solidFill>
+                <a:latin typeface="Avenir Book" panose="02000503020000020003" pitchFamily="2" charset="0"/>
+                <a:ea typeface="Calibri"/>
+                <a:cs typeface="Avenir Light"/>
+                <a:sym typeface="Calibri"/>
+              </a:rPr>
+              <a:t>Nachzulesen unter:</a:t>
+            </a:r>
+            <a:r>
+              <a:rPr sz="800" dirty="0">
+                <a:solidFill>
+                  <a:schemeClr val="tx1">
+                    <a:lumMod val="65000"/>
+                    <a:lumOff val="35000"/>
+                  </a:schemeClr>
+                </a:solidFill>
+                <a:latin typeface="Avenir Book" panose="02000503020000020003" pitchFamily="2" charset="0"/>
+                <a:ea typeface="Calibri"/>
+                <a:cs typeface="Avenir Light"/>
+                <a:sym typeface="Calibri"/>
+              </a:rPr>
+              <a:t> </a:t>
+            </a:r>
+            <a:r>
+              <a:rPr lang="de-DE" sz="800" dirty="0">
+                <a:solidFill>
+                  <a:schemeClr val="tx1">
+                    <a:lumMod val="65000"/>
+                    <a:lumOff val="35000"/>
+                  </a:schemeClr>
+                </a:solidFill>
+                <a:latin typeface="Avenir Book" panose="02000503020000020003" pitchFamily="2" charset="0"/>
+                <a:ea typeface="Calibri"/>
+                <a:cs typeface="Avenir Light"/>
+                <a:sym typeface="Calibri"/>
+              </a:rPr>
+              <a:t>https://</a:t>
+            </a:r>
+            <a:r>
+              <a:rPr lang="de-DE" sz="800" dirty="0" err="1">
+                <a:solidFill>
+                  <a:schemeClr val="tx1">
+                    <a:lumMod val="65000"/>
+                    <a:lumOff val="35000"/>
+                  </a:schemeClr>
+                </a:solidFill>
+                <a:latin typeface="Avenir Book" panose="02000503020000020003" pitchFamily="2" charset="0"/>
+                <a:ea typeface="Calibri"/>
+                <a:cs typeface="Avenir Light"/>
+                <a:sym typeface="Calibri"/>
+              </a:rPr>
+              <a:t>creativecommons.org</a:t>
+            </a:r>
+            <a:r>
+              <a:rPr lang="de-DE" sz="800" dirty="0">
+                <a:solidFill>
+                  <a:schemeClr val="tx1">
+                    <a:lumMod val="65000"/>
+                    <a:lumOff val="35000"/>
+                  </a:schemeClr>
+                </a:solidFill>
+                <a:latin typeface="Avenir Book" panose="02000503020000020003" pitchFamily="2" charset="0"/>
+                <a:ea typeface="Calibri"/>
+                <a:cs typeface="Avenir Light"/>
+                <a:sym typeface="Calibri"/>
+              </a:rPr>
+              <a:t>/</a:t>
+            </a:r>
+            <a:r>
+              <a:rPr lang="de-DE" sz="800" dirty="0" err="1">
+                <a:solidFill>
+                  <a:schemeClr val="tx1">
+                    <a:lumMod val="65000"/>
+                    <a:lumOff val="35000"/>
+                  </a:schemeClr>
+                </a:solidFill>
+                <a:latin typeface="Avenir Book" panose="02000503020000020003" pitchFamily="2" charset="0"/>
+                <a:ea typeface="Calibri"/>
+                <a:cs typeface="Avenir Light"/>
+                <a:sym typeface="Calibri"/>
+              </a:rPr>
+              <a:t>licenses</a:t>
+            </a:r>
+            <a:r>
+              <a:rPr lang="de-DE" sz="800" dirty="0">
+                <a:solidFill>
+                  <a:schemeClr val="tx1">
+                    <a:lumMod val="65000"/>
+                    <a:lumOff val="35000"/>
+                  </a:schemeClr>
+                </a:solidFill>
+                <a:latin typeface="Avenir Book" panose="02000503020000020003" pitchFamily="2" charset="0"/>
+                <a:ea typeface="Calibri"/>
+                <a:cs typeface="Avenir Light"/>
+                <a:sym typeface="Calibri"/>
+              </a:rPr>
+              <a:t>/</a:t>
+            </a:r>
+            <a:r>
+              <a:rPr lang="de-DE" sz="800" dirty="0" err="1">
+                <a:solidFill>
+                  <a:schemeClr val="tx1">
+                    <a:lumMod val="65000"/>
+                    <a:lumOff val="35000"/>
+                  </a:schemeClr>
+                </a:solidFill>
+                <a:latin typeface="Avenir Book" panose="02000503020000020003" pitchFamily="2" charset="0"/>
+                <a:ea typeface="Calibri"/>
+                <a:cs typeface="Avenir Light"/>
+                <a:sym typeface="Calibri"/>
+              </a:rPr>
+              <a:t>by-nc</a:t>
+            </a:r>
+            <a:r>
+              <a:rPr lang="de-DE" sz="800" dirty="0">
+                <a:solidFill>
+                  <a:schemeClr val="tx1">
+                    <a:lumMod val="65000"/>
+                    <a:lumOff val="35000"/>
+                  </a:schemeClr>
+                </a:solidFill>
+                <a:latin typeface="Avenir Book" panose="02000503020000020003" pitchFamily="2" charset="0"/>
+                <a:ea typeface="Calibri"/>
+                <a:cs typeface="Avenir Light"/>
+                <a:sym typeface="Calibri"/>
+              </a:rPr>
+              <a:t>/4.0/</a:t>
+            </a:r>
+            <a:r>
+              <a:rPr lang="de-DE" sz="800" dirty="0" err="1">
+                <a:solidFill>
+                  <a:schemeClr val="tx1">
+                    <a:lumMod val="65000"/>
+                    <a:lumOff val="35000"/>
+                  </a:schemeClr>
+                </a:solidFill>
+                <a:latin typeface="Avenir Book" panose="02000503020000020003" pitchFamily="2" charset="0"/>
+                <a:ea typeface="Calibri"/>
+                <a:cs typeface="Avenir Light"/>
+                <a:sym typeface="Calibri"/>
+              </a:rPr>
+              <a:t>deed.de</a:t>
+            </a:r>
+            <a:endParaRPr sz="800" dirty="0">
+              <a:solidFill>
+                <a:schemeClr val="tx1">
+                  <a:lumMod val="65000"/>
+                  <a:lumOff val="35000"/>
+                </a:schemeClr>
+              </a:solidFill>
+              <a:latin typeface="Avenir Book" panose="02000503020000020003" pitchFamily="2" charset="0"/>
+              <a:ea typeface="Calibri"/>
+              <a:cs typeface="Avenir Light"/>
+              <a:sym typeface="Calibri"/>
+            </a:endParaRPr>
+          </a:p>
+        </p:txBody>
+      </p:sp>
+      <p:pic>
+        <p:nvPicPr>
+          <p:cNvPr id="4" name="pasted-image.tif">
+            <a:extLst>
+              <a:ext uri="{FF2B5EF4-FFF2-40B4-BE49-F238E27FC236}">
+                <a16:creationId xmlns:a16="http://schemas.microsoft.com/office/drawing/2014/main" id="{70CFC941-A9D4-D6BC-E9C8-83B6F6A5EFAE}"/>
+              </a:ext>
+            </a:extLst>
+          </p:cNvPr>
+          <p:cNvPicPr/>
+          <p:nvPr/>
+        </p:nvPicPr>
+        <p:blipFill rotWithShape="1">
+          <a:blip r:embed="rId2"/>
+          <a:srcRect r="24777" b="-3233"/>
+          <a:stretch/>
+        </p:blipFill>
+        <p:spPr>
+          <a:xfrm>
+            <a:off x="5724347" y="4733926"/>
+            <a:ext cx="1009828" cy="333374"/>
+          </a:xfrm>
+          <a:prstGeom prst="rect">
+            <a:avLst/>
+          </a:prstGeom>
+          <a:ln w="12700">
+            <a:miter lim="400000"/>
+          </a:ln>
+        </p:spPr>
+      </p:pic>
     </p:spTree>
     <p:extLst>
       <p:ext uri="{BB962C8B-B14F-4D97-AF65-F5344CB8AC3E}">

</xml_diff>